<commit_message>
Improved the figures for the breakdown scores
</commit_message>
<xml_diff>
--- a/chapter_05/figures/rainfall_based_ff_verif_breakdown_scores_rel_diag_1rp.pptx
+++ b/chapter_05/figures/rainfall_based_ff_verif_breakdown_scores_rel_diag_1rp.pptx
@@ -115,7 +115,7 @@
 <file path=ppt/revisionInfo.xml><?xml version="1.0" encoding="utf-8"?>
 <p1510:revInfo xmlns:a="http://schemas.openxmlformats.org/drawingml/2006/main" xmlns:r="http://schemas.openxmlformats.org/officeDocument/2006/relationships" xmlns:p1510="http://schemas.microsoft.com/office/powerpoint/2015/10/main">
   <p1510:revLst>
-    <p1510:client id="{0F071940-DD68-4CEA-9DDC-F961E0B3FF69}" v="25" dt="2025-05-24T16:57:28.976"/>
+    <p1510:client id="{0F071940-DD68-4CEA-9DDC-F961E0B3FF69}" v="29" dt="2025-05-24T17:19:02.193"/>
   </p1510:revLst>
 </p1510:revInfo>
 </file>
@@ -125,18 +125,42 @@
   <pc:docChgLst>
     <pc:chgData name="Fatima Pillosu" userId="a6295d4dc9e22643" providerId="LiveId" clId="{0F071940-DD68-4CEA-9DDC-F961E0B3FF69}"/>
     <pc:docChg chg="undo custSel addSld delSld modSld">
-      <pc:chgData name="Fatima Pillosu" userId="a6295d4dc9e22643" providerId="LiveId" clId="{0F071940-DD68-4CEA-9DDC-F961E0B3FF69}" dt="2025-05-24T17:04:31.715" v="507" actId="47"/>
+      <pc:chgData name="Fatima Pillosu" userId="a6295d4dc9e22643" providerId="LiveId" clId="{0F071940-DD68-4CEA-9DDC-F961E0B3FF69}" dt="2025-05-24T17:20:00.191" v="697" actId="1038"/>
       <pc:docMkLst>
         <pc:docMk/>
       </pc:docMkLst>
       <pc:sldChg chg="addSp delSp modSp mod">
-        <pc:chgData name="Fatima Pillosu" userId="a6295d4dc9e22643" providerId="LiveId" clId="{0F071940-DD68-4CEA-9DDC-F961E0B3FF69}" dt="2025-05-24T17:04:13.970" v="506" actId="1076"/>
+        <pc:chgData name="Fatima Pillosu" userId="a6295d4dc9e22643" providerId="LiveId" clId="{0F071940-DD68-4CEA-9DDC-F961E0B3FF69}" dt="2025-05-24T17:20:00.191" v="697" actId="1038"/>
         <pc:sldMkLst>
           <pc:docMk/>
           <pc:sldMk cId="2001934226" sldId="256"/>
         </pc:sldMkLst>
+        <pc:spChg chg="add mod">
+          <ac:chgData name="Fatima Pillosu" userId="a6295d4dc9e22643" providerId="LiveId" clId="{0F071940-DD68-4CEA-9DDC-F961E0B3FF69}" dt="2025-05-24T17:20:00.191" v="697" actId="1038"/>
+          <ac:spMkLst>
+            <pc:docMk/>
+            <pc:sldMk cId="2001934226" sldId="256"/>
+            <ac:spMk id="3" creationId="{D32E77C5-B6C0-2E90-479B-0C848DD41382}"/>
+          </ac:spMkLst>
+        </pc:spChg>
+        <pc:spChg chg="add mod">
+          <ac:chgData name="Fatima Pillosu" userId="a6295d4dc9e22643" providerId="LiveId" clId="{0F071940-DD68-4CEA-9DDC-F961E0B3FF69}" dt="2025-05-24T17:19:46.869" v="690" actId="12789"/>
+          <ac:spMkLst>
+            <pc:docMk/>
+            <pc:sldMk cId="2001934226" sldId="256"/>
+            <ac:spMk id="4" creationId="{4B7F958A-6F0C-F0C0-BE54-70B5CC44C3D2}"/>
+          </ac:spMkLst>
+        </pc:spChg>
+        <pc:spChg chg="add mod">
+          <ac:chgData name="Fatima Pillosu" userId="a6295d4dc9e22643" providerId="LiveId" clId="{0F071940-DD68-4CEA-9DDC-F961E0B3FF69}" dt="2025-05-24T17:19:46.869" v="690" actId="12789"/>
+          <ac:spMkLst>
+            <pc:docMk/>
+            <pc:sldMk cId="2001934226" sldId="256"/>
+            <ac:spMk id="6" creationId="{B71CAA66-DF64-85B8-23B3-7DBDDB44438A}"/>
+          </ac:spMkLst>
+        </pc:spChg>
         <pc:spChg chg="mod">
-          <ac:chgData name="Fatima Pillosu" userId="a6295d4dc9e22643" providerId="LiveId" clId="{0F071940-DD68-4CEA-9DDC-F961E0B3FF69}" dt="2025-05-24T16:43:01.876" v="183" actId="255"/>
+          <ac:chgData name="Fatima Pillosu" userId="a6295d4dc9e22643" providerId="LiveId" clId="{0F071940-DD68-4CEA-9DDC-F961E0B3FF69}" dt="2025-05-24T17:17:37.028" v="534" actId="207"/>
           <ac:spMkLst>
             <pc:docMk/>
             <pc:sldMk cId="2001934226" sldId="256"/>
@@ -144,7 +168,7 @@
           </ac:spMkLst>
         </pc:spChg>
         <pc:spChg chg="mod">
-          <ac:chgData name="Fatima Pillosu" userId="a6295d4dc9e22643" providerId="LiveId" clId="{0F071940-DD68-4CEA-9DDC-F961E0B3FF69}" dt="2025-05-24T17:03:26.104" v="487" actId="1036"/>
+          <ac:chgData name="Fatima Pillosu" userId="a6295d4dc9e22643" providerId="LiveId" clId="{0F071940-DD68-4CEA-9DDC-F961E0B3FF69}" dt="2025-05-24T17:15:44.429" v="527" actId="1036"/>
           <ac:spMkLst>
             <pc:docMk/>
             <pc:sldMk cId="2001934226" sldId="256"/>
@@ -152,7 +176,7 @@
           </ac:spMkLst>
         </pc:spChg>
         <pc:spChg chg="mod">
-          <ac:chgData name="Fatima Pillosu" userId="a6295d4dc9e22643" providerId="LiveId" clId="{0F071940-DD68-4CEA-9DDC-F961E0B3FF69}" dt="2025-05-24T17:04:04.288" v="504" actId="1076"/>
+          <ac:chgData name="Fatima Pillosu" userId="a6295d4dc9e22643" providerId="LiveId" clId="{0F071940-DD68-4CEA-9DDC-F961E0B3FF69}" dt="2025-05-24T17:15:44.429" v="527" actId="1036"/>
           <ac:spMkLst>
             <pc:docMk/>
             <pc:sldMk cId="2001934226" sldId="256"/>
@@ -160,7 +184,7 @@
           </ac:spMkLst>
         </pc:spChg>
         <pc:spChg chg="mod">
-          <ac:chgData name="Fatima Pillosu" userId="a6295d4dc9e22643" providerId="LiveId" clId="{0F071940-DD68-4CEA-9DDC-F961E0B3FF69}" dt="2025-05-24T17:03:40.293" v="499" actId="1035"/>
+          <ac:chgData name="Fatima Pillosu" userId="a6295d4dc9e22643" providerId="LiveId" clId="{0F071940-DD68-4CEA-9DDC-F961E0B3FF69}" dt="2025-05-24T17:14:46.706" v="519" actId="1036"/>
           <ac:spMkLst>
             <pc:docMk/>
             <pc:sldMk cId="2001934226" sldId="256"/>
@@ -168,7 +192,7 @@
           </ac:spMkLst>
         </pc:spChg>
         <pc:spChg chg="mod">
-          <ac:chgData name="Fatima Pillosu" userId="a6295d4dc9e22643" providerId="LiveId" clId="{0F071940-DD68-4CEA-9DDC-F961E0B3FF69}" dt="2025-05-24T17:04:09.647" v="505" actId="1076"/>
+          <ac:chgData name="Fatima Pillosu" userId="a6295d4dc9e22643" providerId="LiveId" clId="{0F071940-DD68-4CEA-9DDC-F961E0B3FF69}" dt="2025-05-24T17:14:46.706" v="519" actId="1036"/>
           <ac:spMkLst>
             <pc:docMk/>
             <pc:sldMk cId="2001934226" sldId="256"/>
@@ -199,6 +223,14 @@
             <ac:picMk id="2" creationId="{847636C1-0B22-4CAB-1E52-76406872C992}"/>
           </ac:picMkLst>
         </pc:picChg>
+        <pc:picChg chg="add del mod modCrop">
+          <ac:chgData name="Fatima Pillosu" userId="a6295d4dc9e22643" providerId="LiveId" clId="{0F071940-DD68-4CEA-9DDC-F961E0B3FF69}" dt="2025-05-24T17:19:18.235" v="639" actId="478"/>
+          <ac:picMkLst>
+            <pc:docMk/>
+            <pc:sldMk cId="2001934226" sldId="256"/>
+            <ac:picMk id="2" creationId="{DC553AE9-05E3-6E35-B62F-DA091929FE18}"/>
+          </ac:picMkLst>
+        </pc:picChg>
         <pc:picChg chg="del mod">
           <ac:chgData name="Fatima Pillosu" userId="a6295d4dc9e22643" providerId="LiveId" clId="{0F071940-DD68-4CEA-9DDC-F961E0B3FF69}" dt="2025-05-22T23:02:37.841" v="64" actId="478"/>
           <ac:picMkLst>
@@ -336,7 +368,7 @@
           </ac:picMkLst>
         </pc:picChg>
         <pc:picChg chg="add mod ord modCrop">
-          <ac:chgData name="Fatima Pillosu" userId="a6295d4dc9e22643" providerId="LiveId" clId="{0F071940-DD68-4CEA-9DDC-F961E0B3FF69}" dt="2025-05-24T17:03:08.053" v="479" actId="1036"/>
+          <ac:chgData name="Fatima Pillosu" userId="a6295d4dc9e22643" providerId="LiveId" clId="{0F071940-DD68-4CEA-9DDC-F961E0B3FF69}" dt="2025-05-24T17:15:44.429" v="527" actId="1036"/>
           <ac:picMkLst>
             <pc:docMk/>
             <pc:sldMk cId="2001934226" sldId="256"/>
@@ -352,11 +384,27 @@
           </ac:picMkLst>
         </pc:picChg>
         <pc:picChg chg="add mod ord">
-          <ac:chgData name="Fatima Pillosu" userId="a6295d4dc9e22643" providerId="LiveId" clId="{0F071940-DD68-4CEA-9DDC-F961E0B3FF69}" dt="2025-05-24T17:03:08.053" v="479" actId="1036"/>
+          <ac:chgData name="Fatima Pillosu" userId="a6295d4dc9e22643" providerId="LiveId" clId="{0F071940-DD68-4CEA-9DDC-F961E0B3FF69}" dt="2025-05-24T17:15:44.429" v="527" actId="1036"/>
           <ac:picMkLst>
             <pc:docMk/>
             <pc:sldMk cId="2001934226" sldId="256"/>
             <ac:picMk id="20" creationId="{9AE58AB0-A746-CB79-DB68-4742D849225C}"/>
+          </ac:picMkLst>
+        </pc:picChg>
+        <pc:picChg chg="add mod ord modCrop">
+          <ac:chgData name="Fatima Pillosu" userId="a6295d4dc9e22643" providerId="LiveId" clId="{0F071940-DD68-4CEA-9DDC-F961E0B3FF69}" dt="2025-05-24T17:14:46.706" v="519" actId="1036"/>
+          <ac:picMkLst>
+            <pc:docMk/>
+            <pc:sldMk cId="2001934226" sldId="256"/>
+            <ac:picMk id="27" creationId="{6B8AF29E-2315-3062-9B85-D14957DB473E}"/>
+          </ac:picMkLst>
+        </pc:picChg>
+        <pc:picChg chg="add mod ord">
+          <ac:chgData name="Fatima Pillosu" userId="a6295d4dc9e22643" providerId="LiveId" clId="{0F071940-DD68-4CEA-9DDC-F961E0B3FF69}" dt="2025-05-24T17:14:46.706" v="519" actId="1036"/>
+          <ac:picMkLst>
+            <pc:docMk/>
+            <pc:sldMk cId="2001934226" sldId="256"/>
+            <ac:picMk id="29" creationId="{65189D81-F03A-641F-947A-FEB007DBA5BF}"/>
           </ac:picMkLst>
         </pc:picChg>
         <pc:picChg chg="add mod ord modCrop">
@@ -364,15 +412,7 @@
           <ac:picMkLst>
             <pc:docMk/>
             <pc:sldMk cId="2001934226" sldId="256"/>
-            <ac:picMk id="27" creationId="{6B8AF29E-2315-3062-9B85-D14957DB473E}"/>
-          </ac:picMkLst>
-        </pc:picChg>
-        <pc:picChg chg="add mod ord">
-          <ac:chgData name="Fatima Pillosu" userId="a6295d4dc9e22643" providerId="LiveId" clId="{0F071940-DD68-4CEA-9DDC-F961E0B3FF69}" dt="2025-05-24T17:03:08.053" v="479" actId="1036"/>
-          <ac:picMkLst>
-            <pc:docMk/>
-            <pc:sldMk cId="2001934226" sldId="256"/>
-            <ac:picMk id="29" creationId="{65189D81-F03A-641F-947A-FEB007DBA5BF}"/>
+            <ac:picMk id="31" creationId="{10BAFD11-1099-3C3B-C9FC-C353CD903E7A}"/>
           </ac:picMkLst>
         </pc:picChg>
         <pc:picChg chg="add mod ord modCrop">
@@ -380,17 +420,17 @@
           <ac:picMkLst>
             <pc:docMk/>
             <pc:sldMk cId="2001934226" sldId="256"/>
-            <ac:picMk id="31" creationId="{10BAFD11-1099-3C3B-C9FC-C353CD903E7A}"/>
-          </ac:picMkLst>
-        </pc:picChg>
-        <pc:picChg chg="add mod ord modCrop">
-          <ac:chgData name="Fatima Pillosu" userId="a6295d4dc9e22643" providerId="LiveId" clId="{0F071940-DD68-4CEA-9DDC-F961E0B3FF69}" dt="2025-05-24T17:03:08.053" v="479" actId="1036"/>
-          <ac:picMkLst>
-            <pc:docMk/>
-            <pc:sldMk cId="2001934226" sldId="256"/>
             <ac:picMk id="33" creationId="{FB8578E7-859D-CDA0-F749-138863AF1E37}"/>
           </ac:picMkLst>
         </pc:picChg>
+        <pc:cxnChg chg="add mod">
+          <ac:chgData name="Fatima Pillosu" userId="a6295d4dc9e22643" providerId="LiveId" clId="{0F071940-DD68-4CEA-9DDC-F961E0B3FF69}" dt="2025-05-24T17:20:00.191" v="697" actId="1038"/>
+          <ac:cxnSpMkLst>
+            <pc:docMk/>
+            <pc:sldMk cId="2001934226" sldId="256"/>
+            <ac:cxnSpMk id="5" creationId="{80B63810-D1D9-8EEB-E25A-478D292B229D}"/>
+          </ac:cxnSpMkLst>
+        </pc:cxnChg>
       </pc:sldChg>
       <pc:sldChg chg="addSp delSp modSp new del mod">
         <pc:chgData name="Fatima Pillosu" userId="a6295d4dc9e22643" providerId="LiveId" clId="{0F071940-DD68-4CEA-9DDC-F961E0B3FF69}" dt="2025-05-22T23:12:15.968" v="145" actId="2696"/>
@@ -3731,7 +3771,7 @@
         </p:blipFill>
         <p:spPr>
           <a:xfrm>
-            <a:off x="13930" y="499865"/>
+            <a:off x="13930" y="565769"/>
             <a:ext cx="2160000" cy="1868906"/>
           </a:xfrm>
           <a:prstGeom prst="rect">
@@ -3766,7 +3806,7 @@
         </p:blipFill>
         <p:spPr>
           <a:xfrm>
-            <a:off x="2213102" y="499865"/>
+            <a:off x="2213102" y="565769"/>
             <a:ext cx="1911977" cy="1868400"/>
           </a:xfrm>
           <a:prstGeom prst="rect">
@@ -3801,7 +3841,7 @@
         </p:blipFill>
         <p:spPr>
           <a:xfrm>
-            <a:off x="13930" y="2450524"/>
+            <a:off x="13930" y="2483476"/>
             <a:ext cx="2160000" cy="1868906"/>
           </a:xfrm>
           <a:prstGeom prst="rect">
@@ -3836,7 +3876,7 @@
         </p:blipFill>
         <p:spPr>
           <a:xfrm>
-            <a:off x="2213102" y="2450524"/>
+            <a:off x="2213102" y="2483476"/>
             <a:ext cx="1911977" cy="1868400"/>
           </a:xfrm>
           <a:prstGeom prst="rect">
@@ -3945,10 +3985,7 @@
             <a:r>
               <a:rPr lang="en-US" sz="1200" b="1" dirty="0">
                 <a:solidFill>
-                  <a:schemeClr val="tx1">
-                    <a:lumMod val="95000"/>
-                    <a:lumOff val="5000"/>
-                  </a:schemeClr>
+                  <a:srgbClr val="333333"/>
                 </a:solidFill>
                 <a:latin typeface="Calibri" panose="020F0502020204030204" pitchFamily="34" charset="0"/>
                 <a:cs typeface="Calibri" panose="020F0502020204030204" pitchFamily="34" charset="0"/>
@@ -3960,10 +3997,7 @@
             <a:r>
               <a:rPr lang="en-US" sz="1000" dirty="0">
                 <a:solidFill>
-                  <a:schemeClr val="tx1">
-                    <a:lumMod val="95000"/>
-                    <a:lumOff val="5000"/>
-                  </a:schemeClr>
+                  <a:srgbClr val="333333"/>
                 </a:solidFill>
                 <a:latin typeface="Calibri Light" panose="020F0302020204030204" pitchFamily="34" charset="0"/>
                 <a:cs typeface="Calibri Light" panose="020F0302020204030204" pitchFamily="34" charset="0"/>
@@ -3973,10 +4007,7 @@
             <a:r>
               <a:rPr lang="en-US" sz="1000" u="sng" dirty="0">
                 <a:solidFill>
-                  <a:schemeClr val="tx1">
-                    <a:lumMod val="95000"/>
-                    <a:lumOff val="5000"/>
-                  </a:schemeClr>
+                  <a:srgbClr val="333333"/>
                 </a:solidFill>
                 <a:latin typeface="Calibri Light" panose="020F0302020204030204" pitchFamily="34" charset="0"/>
                 <a:cs typeface="Calibri Light" panose="020F0302020204030204" pitchFamily="34" charset="0"/>
@@ -3985,10 +4016,7 @@
             </a:r>
             <a:endParaRPr lang="en-GB" sz="1000" u="sng" dirty="0">
               <a:solidFill>
-                <a:schemeClr val="tx1">
-                  <a:lumMod val="95000"/>
-                  <a:lumOff val="5000"/>
-                </a:schemeClr>
+                <a:srgbClr val="333333"/>
               </a:solidFill>
               <a:latin typeface="Calibri Light" panose="020F0302020204030204" pitchFamily="34" charset="0"/>
               <a:cs typeface="Calibri Light" panose="020F0302020204030204" pitchFamily="34" charset="0"/>
@@ -4010,7 +4038,7 @@
         </p:nvSpPr>
         <p:spPr>
           <a:xfrm>
-            <a:off x="376106" y="1399150"/>
+            <a:off x="376106" y="1465054"/>
             <a:ext cx="842873" cy="461665"/>
           </a:xfrm>
           <a:prstGeom prst="rect">
@@ -4074,7 +4102,7 @@
         </p:nvSpPr>
         <p:spPr>
           <a:xfrm>
-            <a:off x="2325878" y="1399149"/>
+            <a:off x="2325878" y="1465053"/>
             <a:ext cx="842873" cy="461665"/>
           </a:xfrm>
           <a:prstGeom prst="rect">
@@ -4138,7 +4166,7 @@
         </p:nvSpPr>
         <p:spPr>
           <a:xfrm>
-            <a:off x="376106" y="3356661"/>
+            <a:off x="376106" y="3389613"/>
             <a:ext cx="842873" cy="461665"/>
           </a:xfrm>
           <a:prstGeom prst="rect">
@@ -4202,7 +4230,7 @@
         </p:nvSpPr>
         <p:spPr>
           <a:xfrm>
-            <a:off x="2325878" y="3356661"/>
+            <a:off x="2325878" y="3389613"/>
             <a:ext cx="842873" cy="461665"/>
           </a:xfrm>
           <a:prstGeom prst="rect">
@@ -4366,6 +4394,221 @@
                 <a:cs typeface="Calibri Light" panose="020F0302020204030204" pitchFamily="34" charset="0"/>
               </a:rPr>
               <a:t>f) long-range forecast (t+96,t+120)</a:t>
+            </a:r>
+            <a:endParaRPr lang="en-GB" sz="800" dirty="0">
+              <a:solidFill>
+                <a:schemeClr val="tx1">
+                  <a:lumMod val="95000"/>
+                  <a:lumOff val="5000"/>
+                </a:schemeClr>
+              </a:solidFill>
+              <a:latin typeface="Calibri Light" panose="020F0302020204030204" pitchFamily="34" charset="0"/>
+              <a:cs typeface="Calibri Light" panose="020F0302020204030204" pitchFamily="34" charset="0"/>
+            </a:endParaRPr>
+          </a:p>
+        </p:txBody>
+      </p:sp>
+      <p:sp>
+        <p:nvSpPr>
+          <p:cNvPr id="3" name="TextBox 2">
+            <a:extLst>
+              <a:ext uri="{FF2B5EF4-FFF2-40B4-BE49-F238E27FC236}">
+                <a16:creationId xmlns:a16="http://schemas.microsoft.com/office/drawing/2014/main" id="{D32E77C5-B6C0-2E90-479B-0C848DD41382}"/>
+              </a:ext>
+            </a:extLst>
+          </p:cNvPr>
+          <p:cNvSpPr txBox="1"/>
+          <p:nvPr/>
+        </p:nvSpPr>
+        <p:spPr>
+          <a:xfrm>
+            <a:off x="1079243" y="354873"/>
+            <a:ext cx="1196419" cy="215444"/>
+          </a:xfrm>
+          <a:prstGeom prst="rect">
+            <a:avLst/>
+          </a:prstGeom>
+          <a:noFill/>
+          <a:ln>
+            <a:noFill/>
+          </a:ln>
+        </p:spPr>
+        <p:txBody>
+          <a:bodyPr wrap="square" rtlCol="0">
+            <a:spAutoFit/>
+          </a:bodyPr>
+          <a:lstStyle/>
+          <a:p>
+            <a:r>
+              <a:rPr lang="en-US" sz="800" dirty="0">
+                <a:solidFill>
+                  <a:schemeClr val="tx1">
+                    <a:lumMod val="95000"/>
+                    <a:lumOff val="5000"/>
+                  </a:schemeClr>
+                </a:solidFill>
+                <a:latin typeface="Calibri Light" panose="020F0302020204030204" pitchFamily="34" charset="0"/>
+                <a:cs typeface="Calibri Light" panose="020F0302020204030204" pitchFamily="34" charset="0"/>
+              </a:rPr>
+              <a:t>Reliability diagram</a:t>
+            </a:r>
+            <a:endParaRPr lang="en-GB" sz="800" dirty="0">
+              <a:solidFill>
+                <a:schemeClr val="tx1">
+                  <a:lumMod val="95000"/>
+                  <a:lumOff val="5000"/>
+                </a:schemeClr>
+              </a:solidFill>
+              <a:latin typeface="Calibri Light" panose="020F0302020204030204" pitchFamily="34" charset="0"/>
+              <a:cs typeface="Calibri Light" panose="020F0302020204030204" pitchFamily="34" charset="0"/>
+            </a:endParaRPr>
+          </a:p>
+        </p:txBody>
+      </p:sp>
+      <p:sp>
+        <p:nvSpPr>
+          <p:cNvPr id="4" name="Rectangle 3">
+            <a:extLst>
+              <a:ext uri="{FF2B5EF4-FFF2-40B4-BE49-F238E27FC236}">
+                <a16:creationId xmlns:a16="http://schemas.microsoft.com/office/drawing/2014/main" id="{4B7F958A-6F0C-F0C0-BE54-70B5CC44C3D2}"/>
+              </a:ext>
+            </a:extLst>
+          </p:cNvPr>
+          <p:cNvSpPr/>
+          <p:nvPr/>
+        </p:nvSpPr>
+        <p:spPr>
+          <a:xfrm>
+            <a:off x="2090746" y="417595"/>
+            <a:ext cx="360000" cy="90000"/>
+          </a:xfrm>
+          <a:prstGeom prst="rect">
+            <a:avLst/>
+          </a:prstGeom>
+          <a:solidFill>
+            <a:srgbClr val="DB0E37">
+              <a:alpha val="25000"/>
+            </a:srgbClr>
+          </a:solidFill>
+          <a:ln>
+            <a:noFill/>
+          </a:ln>
+        </p:spPr>
+        <p:style>
+          <a:lnRef idx="2">
+            <a:schemeClr val="accent1">
+              <a:shade val="15000"/>
+            </a:schemeClr>
+          </a:lnRef>
+          <a:fillRef idx="1">
+            <a:schemeClr val="accent1"/>
+          </a:fillRef>
+          <a:effectRef idx="0">
+            <a:schemeClr val="accent1"/>
+          </a:effectRef>
+          <a:fontRef idx="minor">
+            <a:schemeClr val="lt1"/>
+          </a:fontRef>
+        </p:style>
+        <p:txBody>
+          <a:bodyPr rtlCol="0" anchor="ctr"/>
+          <a:lstStyle/>
+          <a:p>
+            <a:pPr algn="ctr"/>
+            <a:r>
+              <a:rPr lang="en-US" dirty="0"/>
+              <a:t>.</a:t>
+            </a:r>
+            <a:endParaRPr lang="en-GB" dirty="0"/>
+          </a:p>
+        </p:txBody>
+      </p:sp>
+      <p:cxnSp>
+        <p:nvCxnSpPr>
+          <p:cNvPr id="5" name="Straight Connector 4">
+            <a:extLst>
+              <a:ext uri="{FF2B5EF4-FFF2-40B4-BE49-F238E27FC236}">
+                <a16:creationId xmlns:a16="http://schemas.microsoft.com/office/drawing/2014/main" id="{80B63810-D1D9-8EEB-E25A-478D292B229D}"/>
+              </a:ext>
+            </a:extLst>
+          </p:cNvPr>
+          <p:cNvCxnSpPr>
+            <a:cxnSpLocks/>
+          </p:cNvCxnSpPr>
+          <p:nvPr/>
+        </p:nvCxnSpPr>
+        <p:spPr>
+          <a:xfrm>
+            <a:off x="783439" y="462595"/>
+            <a:ext cx="360000" cy="0"/>
+          </a:xfrm>
+          <a:prstGeom prst="line">
+            <a:avLst/>
+          </a:prstGeom>
+          <a:ln w="12700">
+            <a:solidFill>
+              <a:srgbClr val="DB0E37"/>
+            </a:solidFill>
+          </a:ln>
+        </p:spPr>
+        <p:style>
+          <a:lnRef idx="2">
+            <a:schemeClr val="accent1"/>
+          </a:lnRef>
+          <a:fillRef idx="0">
+            <a:schemeClr val="accent1"/>
+          </a:fillRef>
+          <a:effectRef idx="1">
+            <a:schemeClr val="accent1"/>
+          </a:effectRef>
+          <a:fontRef idx="minor">
+            <a:schemeClr val="tx1"/>
+          </a:fontRef>
+        </p:style>
+      </p:cxnSp>
+      <p:sp>
+        <p:nvSpPr>
+          <p:cNvPr id="6" name="TextBox 5">
+            <a:extLst>
+              <a:ext uri="{FF2B5EF4-FFF2-40B4-BE49-F238E27FC236}">
+                <a16:creationId xmlns:a16="http://schemas.microsoft.com/office/drawing/2014/main" id="{B71CAA66-DF64-85B8-23B3-7DBDDB44438A}"/>
+              </a:ext>
+            </a:extLst>
+          </p:cNvPr>
+          <p:cNvSpPr txBox="1"/>
+          <p:nvPr/>
+        </p:nvSpPr>
+        <p:spPr>
+          <a:xfrm>
+            <a:off x="2389418" y="354873"/>
+            <a:ext cx="1196419" cy="215444"/>
+          </a:xfrm>
+          <a:prstGeom prst="rect">
+            <a:avLst/>
+          </a:prstGeom>
+          <a:noFill/>
+          <a:ln>
+            <a:noFill/>
+          </a:ln>
+        </p:spPr>
+        <p:txBody>
+          <a:bodyPr wrap="square" rtlCol="0">
+            <a:spAutoFit/>
+          </a:bodyPr>
+          <a:lstStyle/>
+          <a:p>
+            <a:r>
+              <a:rPr lang="en-US" sz="800" dirty="0">
+                <a:solidFill>
+                  <a:schemeClr val="tx1">
+                    <a:lumMod val="95000"/>
+                    <a:lumOff val="5000"/>
+                  </a:schemeClr>
+                </a:solidFill>
+                <a:latin typeface="Calibri Light" panose="020F0302020204030204" pitchFamily="34" charset="0"/>
+                <a:cs typeface="Calibri Light" panose="020F0302020204030204" pitchFamily="34" charset="0"/>
+              </a:rPr>
+              <a:t>99% confidence interval</a:t>
             </a:r>
             <a:endParaRPr lang="en-GB" sz="800" dirty="0">
               <a:solidFill>

</xml_diff>

<commit_message>
Improve the figures of the breakdoiwn scores
</commit_message>
<xml_diff>
--- a/chapter_05/figures/rainfall_based_ff_verif_breakdown_scores_rel_diag_1rp.pptx
+++ b/chapter_05/figures/rainfall_based_ff_verif_breakdown_scores_rel_diag_1rp.pptx
@@ -115,7 +115,7 @@
 <file path=ppt/revisionInfo.xml><?xml version="1.0" encoding="utf-8"?>
 <p1510:revInfo xmlns:a="http://schemas.openxmlformats.org/drawingml/2006/main" xmlns:r="http://schemas.openxmlformats.org/officeDocument/2006/relationships" xmlns:p1510="http://schemas.microsoft.com/office/powerpoint/2015/10/main">
   <p1510:revLst>
-    <p1510:client id="{0F071940-DD68-4CEA-9DDC-F961E0B3FF69}" v="29" dt="2025-05-24T17:19:02.193"/>
+    <p1510:client id="{0F071940-DD68-4CEA-9DDC-F961E0B3FF69}" v="30" dt="2025-05-24T17:39:31.777"/>
   </p1510:revLst>
 </p1510:revInfo>
 </file>
@@ -125,18 +125,26 @@
   <pc:docChgLst>
     <pc:chgData name="Fatima Pillosu" userId="a6295d4dc9e22643" providerId="LiveId" clId="{0F071940-DD68-4CEA-9DDC-F961E0B3FF69}"/>
     <pc:docChg chg="undo custSel addSld delSld modSld">
-      <pc:chgData name="Fatima Pillosu" userId="a6295d4dc9e22643" providerId="LiveId" clId="{0F071940-DD68-4CEA-9DDC-F961E0B3FF69}" dt="2025-05-24T17:20:00.191" v="697" actId="1038"/>
+      <pc:chgData name="Fatima Pillosu" userId="a6295d4dc9e22643" providerId="LiveId" clId="{0F071940-DD68-4CEA-9DDC-F961E0B3FF69}" dt="2025-05-24T17:42:39.553" v="880" actId="1036"/>
       <pc:docMkLst>
         <pc:docMk/>
       </pc:docMkLst>
       <pc:sldChg chg="addSp delSp modSp mod">
-        <pc:chgData name="Fatima Pillosu" userId="a6295d4dc9e22643" providerId="LiveId" clId="{0F071940-DD68-4CEA-9DDC-F961E0B3FF69}" dt="2025-05-24T17:20:00.191" v="697" actId="1038"/>
+        <pc:chgData name="Fatima Pillosu" userId="a6295d4dc9e22643" providerId="LiveId" clId="{0F071940-DD68-4CEA-9DDC-F961E0B3FF69}" dt="2025-05-24T17:42:39.553" v="880" actId="1036"/>
         <pc:sldMkLst>
           <pc:docMk/>
           <pc:sldMk cId="2001934226" sldId="256"/>
         </pc:sldMkLst>
         <pc:spChg chg="add mod">
-          <ac:chgData name="Fatima Pillosu" userId="a6295d4dc9e22643" providerId="LiveId" clId="{0F071940-DD68-4CEA-9DDC-F961E0B3FF69}" dt="2025-05-24T17:20:00.191" v="697" actId="1038"/>
+          <ac:chgData name="Fatima Pillosu" userId="a6295d4dc9e22643" providerId="LiveId" clId="{0F071940-DD68-4CEA-9DDC-F961E0B3FF69}" dt="2025-05-24T17:42:13.973" v="873" actId="1038"/>
+          <ac:spMkLst>
+            <pc:docMk/>
+            <pc:sldMk cId="2001934226" sldId="256"/>
+            <ac:spMk id="2" creationId="{A4DB30E2-0C13-6AEB-59CD-284D83DB8123}"/>
+          </ac:spMkLst>
+        </pc:spChg>
+        <pc:spChg chg="add mod">
+          <ac:chgData name="Fatima Pillosu" userId="a6295d4dc9e22643" providerId="LiveId" clId="{0F071940-DD68-4CEA-9DDC-F961E0B3FF69}" dt="2025-05-24T17:42:39.553" v="880" actId="1036"/>
           <ac:spMkLst>
             <pc:docMk/>
             <pc:sldMk cId="2001934226" sldId="256"/>
@@ -144,7 +152,7 @@
           </ac:spMkLst>
         </pc:spChg>
         <pc:spChg chg="add mod">
-          <ac:chgData name="Fatima Pillosu" userId="a6295d4dc9e22643" providerId="LiveId" clId="{0F071940-DD68-4CEA-9DDC-F961E0B3FF69}" dt="2025-05-24T17:19:46.869" v="690" actId="12789"/>
+          <ac:chgData name="Fatima Pillosu" userId="a6295d4dc9e22643" providerId="LiveId" clId="{0F071940-DD68-4CEA-9DDC-F961E0B3FF69}" dt="2025-05-24T17:42:39.553" v="880" actId="1036"/>
           <ac:spMkLst>
             <pc:docMk/>
             <pc:sldMk cId="2001934226" sldId="256"/>
@@ -152,11 +160,51 @@
           </ac:spMkLst>
         </pc:spChg>
         <pc:spChg chg="add mod">
-          <ac:chgData name="Fatima Pillosu" userId="a6295d4dc9e22643" providerId="LiveId" clId="{0F071940-DD68-4CEA-9DDC-F961E0B3FF69}" dt="2025-05-24T17:19:46.869" v="690" actId="12789"/>
+          <ac:chgData name="Fatima Pillosu" userId="a6295d4dc9e22643" providerId="LiveId" clId="{0F071940-DD68-4CEA-9DDC-F961E0B3FF69}" dt="2025-05-24T17:42:39.553" v="880" actId="1036"/>
           <ac:spMkLst>
             <pc:docMk/>
             <pc:sldMk cId="2001934226" sldId="256"/>
             <ac:spMk id="6" creationId="{B71CAA66-DF64-85B8-23B3-7DBDDB44438A}"/>
+          </ac:spMkLst>
+        </pc:spChg>
+        <pc:spChg chg="add mod">
+          <ac:chgData name="Fatima Pillosu" userId="a6295d4dc9e22643" providerId="LiveId" clId="{0F071940-DD68-4CEA-9DDC-F961E0B3FF69}" dt="2025-05-24T17:42:05.395" v="867" actId="1038"/>
+          <ac:spMkLst>
+            <pc:docMk/>
+            <pc:sldMk cId="2001934226" sldId="256"/>
+            <ac:spMk id="7" creationId="{42DFAD48-F16E-0B7B-1B2C-4961BF796F2E}"/>
+          </ac:spMkLst>
+        </pc:spChg>
+        <pc:spChg chg="add mod">
+          <ac:chgData name="Fatima Pillosu" userId="a6295d4dc9e22643" providerId="LiveId" clId="{0F071940-DD68-4CEA-9DDC-F961E0B3FF69}" dt="2025-05-24T17:42:05.395" v="867" actId="1038"/>
+          <ac:spMkLst>
+            <pc:docMk/>
+            <pc:sldMk cId="2001934226" sldId="256"/>
+            <ac:spMk id="8" creationId="{1CB5778A-BC41-27A9-C316-14307500D4A0}"/>
+          </ac:spMkLst>
+        </pc:spChg>
+        <pc:spChg chg="add mod">
+          <ac:chgData name="Fatima Pillosu" userId="a6295d4dc9e22643" providerId="LiveId" clId="{0F071940-DD68-4CEA-9DDC-F961E0B3FF69}" dt="2025-05-24T17:42:05.395" v="867" actId="1038"/>
+          <ac:spMkLst>
+            <pc:docMk/>
+            <pc:sldMk cId="2001934226" sldId="256"/>
+            <ac:spMk id="9" creationId="{AD646CE8-3370-880E-200D-80617E77A9BE}"/>
+          </ac:spMkLst>
+        </pc:spChg>
+        <pc:spChg chg="add mod">
+          <ac:chgData name="Fatima Pillosu" userId="a6295d4dc9e22643" providerId="LiveId" clId="{0F071940-DD68-4CEA-9DDC-F961E0B3FF69}" dt="2025-05-24T17:42:13.973" v="873" actId="1038"/>
+          <ac:spMkLst>
+            <pc:docMk/>
+            <pc:sldMk cId="2001934226" sldId="256"/>
+            <ac:spMk id="10" creationId="{8DB64281-D2AB-318B-65A1-5D1D385CB8D7}"/>
+          </ac:spMkLst>
+        </pc:spChg>
+        <pc:spChg chg="add mod">
+          <ac:chgData name="Fatima Pillosu" userId="a6295d4dc9e22643" providerId="LiveId" clId="{0F071940-DD68-4CEA-9DDC-F961E0B3FF69}" dt="2025-05-24T17:42:13.973" v="873" actId="1038"/>
+          <ac:spMkLst>
+            <pc:docMk/>
+            <pc:sldMk cId="2001934226" sldId="256"/>
+            <ac:spMk id="11" creationId="{E8F936EE-D86D-608C-06B5-BAF9C398C95A}"/>
           </ac:spMkLst>
         </pc:spChg>
         <pc:spChg chg="mod">
@@ -167,48 +215,48 @@
             <ac:spMk id="17" creationId="{7D251682-B46D-DC7E-8C5E-59DFF1C27261}"/>
           </ac:spMkLst>
         </pc:spChg>
-        <pc:spChg chg="mod">
-          <ac:chgData name="Fatima Pillosu" userId="a6295d4dc9e22643" providerId="LiveId" clId="{0F071940-DD68-4CEA-9DDC-F961E0B3FF69}" dt="2025-05-24T17:15:44.429" v="527" actId="1036"/>
+        <pc:spChg chg="del mod">
+          <ac:chgData name="Fatima Pillosu" userId="a6295d4dc9e22643" providerId="LiveId" clId="{0F071940-DD68-4CEA-9DDC-F961E0B3FF69}" dt="2025-05-24T17:39:45.604" v="737" actId="478"/>
           <ac:spMkLst>
             <pc:docMk/>
             <pc:sldMk cId="2001934226" sldId="256"/>
             <ac:spMk id="18" creationId="{18F79773-A305-6943-D6AB-6A9BB374B2B4}"/>
           </ac:spMkLst>
         </pc:spChg>
-        <pc:spChg chg="mod">
-          <ac:chgData name="Fatima Pillosu" userId="a6295d4dc9e22643" providerId="LiveId" clId="{0F071940-DD68-4CEA-9DDC-F961E0B3FF69}" dt="2025-05-24T17:15:44.429" v="527" actId="1036"/>
+        <pc:spChg chg="del mod">
+          <ac:chgData name="Fatima Pillosu" userId="a6295d4dc9e22643" providerId="LiveId" clId="{0F071940-DD68-4CEA-9DDC-F961E0B3FF69}" dt="2025-05-24T17:39:47.460" v="738" actId="478"/>
           <ac:spMkLst>
             <pc:docMk/>
             <pc:sldMk cId="2001934226" sldId="256"/>
             <ac:spMk id="21" creationId="{0284A2DC-04F5-0D2C-8A57-01740B49A0AD}"/>
           </ac:spMkLst>
         </pc:spChg>
-        <pc:spChg chg="mod">
-          <ac:chgData name="Fatima Pillosu" userId="a6295d4dc9e22643" providerId="LiveId" clId="{0F071940-DD68-4CEA-9DDC-F961E0B3FF69}" dt="2025-05-24T17:14:46.706" v="519" actId="1036"/>
+        <pc:spChg chg="del mod">
+          <ac:chgData name="Fatima Pillosu" userId="a6295d4dc9e22643" providerId="LiveId" clId="{0F071940-DD68-4CEA-9DDC-F961E0B3FF69}" dt="2025-05-24T17:39:43.915" v="736" actId="478"/>
           <ac:spMkLst>
             <pc:docMk/>
             <pc:sldMk cId="2001934226" sldId="256"/>
             <ac:spMk id="22" creationId="{7792FD3C-224E-D659-A131-B255E8E96E52}"/>
           </ac:spMkLst>
         </pc:spChg>
-        <pc:spChg chg="mod">
-          <ac:chgData name="Fatima Pillosu" userId="a6295d4dc9e22643" providerId="LiveId" clId="{0F071940-DD68-4CEA-9DDC-F961E0B3FF69}" dt="2025-05-24T17:14:46.706" v="519" actId="1036"/>
+        <pc:spChg chg="del mod">
+          <ac:chgData name="Fatima Pillosu" userId="a6295d4dc9e22643" providerId="LiveId" clId="{0F071940-DD68-4CEA-9DDC-F961E0B3FF69}" dt="2025-05-24T17:39:42.711" v="735" actId="478"/>
           <ac:spMkLst>
             <pc:docMk/>
             <pc:sldMk cId="2001934226" sldId="256"/>
             <ac:spMk id="23" creationId="{F19462D0-2710-AA91-1CCF-483BA08755F9}"/>
           </ac:spMkLst>
         </pc:spChg>
-        <pc:spChg chg="mod">
-          <ac:chgData name="Fatima Pillosu" userId="a6295d4dc9e22643" providerId="LiveId" clId="{0F071940-DD68-4CEA-9DDC-F961E0B3FF69}" dt="2025-05-24T17:03:54.593" v="503" actId="1035"/>
+        <pc:spChg chg="del mod">
+          <ac:chgData name="Fatima Pillosu" userId="a6295d4dc9e22643" providerId="LiveId" clId="{0F071940-DD68-4CEA-9DDC-F961E0B3FF69}" dt="2025-05-24T17:39:39.390" v="733" actId="478"/>
           <ac:spMkLst>
             <pc:docMk/>
             <pc:sldMk cId="2001934226" sldId="256"/>
             <ac:spMk id="24" creationId="{728394F9-CAEC-DD34-1C7D-BCD4BEC3F436}"/>
           </ac:spMkLst>
         </pc:spChg>
-        <pc:spChg chg="mod">
-          <ac:chgData name="Fatima Pillosu" userId="a6295d4dc9e22643" providerId="LiveId" clId="{0F071940-DD68-4CEA-9DDC-F961E0B3FF69}" dt="2025-05-24T17:04:13.970" v="506" actId="1076"/>
+        <pc:spChg chg="del mod">
+          <ac:chgData name="Fatima Pillosu" userId="a6295d4dc9e22643" providerId="LiveId" clId="{0F071940-DD68-4CEA-9DDC-F961E0B3FF69}" dt="2025-05-24T17:39:41.459" v="734" actId="478"/>
           <ac:spMkLst>
             <pc:docMk/>
             <pc:sldMk cId="2001934226" sldId="256"/>
@@ -368,7 +416,7 @@
           </ac:picMkLst>
         </pc:picChg>
         <pc:picChg chg="add mod ord modCrop">
-          <ac:chgData name="Fatima Pillosu" userId="a6295d4dc9e22643" providerId="LiveId" clId="{0F071940-DD68-4CEA-9DDC-F961E0B3FF69}" dt="2025-05-24T17:15:44.429" v="527" actId="1036"/>
+          <ac:chgData name="Fatima Pillosu" userId="a6295d4dc9e22643" providerId="LiveId" clId="{0F071940-DD68-4CEA-9DDC-F961E0B3FF69}" dt="2025-05-24T17:41:44.270" v="846" actId="1038"/>
           <ac:picMkLst>
             <pc:docMk/>
             <pc:sldMk cId="2001934226" sldId="256"/>
@@ -384,7 +432,7 @@
           </ac:picMkLst>
         </pc:picChg>
         <pc:picChg chg="add mod ord">
-          <ac:chgData name="Fatima Pillosu" userId="a6295d4dc9e22643" providerId="LiveId" clId="{0F071940-DD68-4CEA-9DDC-F961E0B3FF69}" dt="2025-05-24T17:15:44.429" v="527" actId="1036"/>
+          <ac:chgData name="Fatima Pillosu" userId="a6295d4dc9e22643" providerId="LiveId" clId="{0F071940-DD68-4CEA-9DDC-F961E0B3FF69}" dt="2025-05-24T17:41:50.963" v="856" actId="1037"/>
           <ac:picMkLst>
             <pc:docMk/>
             <pc:sldMk cId="2001934226" sldId="256"/>
@@ -392,7 +440,7 @@
           </ac:picMkLst>
         </pc:picChg>
         <pc:picChg chg="add mod ord modCrop">
-          <ac:chgData name="Fatima Pillosu" userId="a6295d4dc9e22643" providerId="LiveId" clId="{0F071940-DD68-4CEA-9DDC-F961E0B3FF69}" dt="2025-05-24T17:14:46.706" v="519" actId="1036"/>
+          <ac:chgData name="Fatima Pillosu" userId="a6295d4dc9e22643" providerId="LiveId" clId="{0F071940-DD68-4CEA-9DDC-F961E0B3FF69}" dt="2025-05-24T17:41:44.270" v="846" actId="1038"/>
           <ac:picMkLst>
             <pc:docMk/>
             <pc:sldMk cId="2001934226" sldId="256"/>
@@ -400,7 +448,7 @@
           </ac:picMkLst>
         </pc:picChg>
         <pc:picChg chg="add mod ord">
-          <ac:chgData name="Fatima Pillosu" userId="a6295d4dc9e22643" providerId="LiveId" clId="{0F071940-DD68-4CEA-9DDC-F961E0B3FF69}" dt="2025-05-24T17:14:46.706" v="519" actId="1036"/>
+          <ac:chgData name="Fatima Pillosu" userId="a6295d4dc9e22643" providerId="LiveId" clId="{0F071940-DD68-4CEA-9DDC-F961E0B3FF69}" dt="2025-05-24T17:41:50.963" v="856" actId="1037"/>
           <ac:picMkLst>
             <pc:docMk/>
             <pc:sldMk cId="2001934226" sldId="256"/>
@@ -408,7 +456,7 @@
           </ac:picMkLst>
         </pc:picChg>
         <pc:picChg chg="add mod ord modCrop">
-          <ac:chgData name="Fatima Pillosu" userId="a6295d4dc9e22643" providerId="LiveId" clId="{0F071940-DD68-4CEA-9DDC-F961E0B3FF69}" dt="2025-05-24T17:03:08.053" v="479" actId="1036"/>
+          <ac:chgData name="Fatima Pillosu" userId="a6295d4dc9e22643" providerId="LiveId" clId="{0F071940-DD68-4CEA-9DDC-F961E0B3FF69}" dt="2025-05-24T17:41:44.270" v="846" actId="1038"/>
           <ac:picMkLst>
             <pc:docMk/>
             <pc:sldMk cId="2001934226" sldId="256"/>
@@ -416,7 +464,7 @@
           </ac:picMkLst>
         </pc:picChg>
         <pc:picChg chg="add mod ord modCrop">
-          <ac:chgData name="Fatima Pillosu" userId="a6295d4dc9e22643" providerId="LiveId" clId="{0F071940-DD68-4CEA-9DDC-F961E0B3FF69}" dt="2025-05-24T17:03:08.053" v="479" actId="1036"/>
+          <ac:chgData name="Fatima Pillosu" userId="a6295d4dc9e22643" providerId="LiveId" clId="{0F071940-DD68-4CEA-9DDC-F961E0B3FF69}" dt="2025-05-24T17:41:50.963" v="856" actId="1037"/>
           <ac:picMkLst>
             <pc:docMk/>
             <pc:sldMk cId="2001934226" sldId="256"/>
@@ -424,7 +472,7 @@
           </ac:picMkLst>
         </pc:picChg>
         <pc:cxnChg chg="add mod">
-          <ac:chgData name="Fatima Pillosu" userId="a6295d4dc9e22643" providerId="LiveId" clId="{0F071940-DD68-4CEA-9DDC-F961E0B3FF69}" dt="2025-05-24T17:20:00.191" v="697" actId="1038"/>
+          <ac:chgData name="Fatima Pillosu" userId="a6295d4dc9e22643" providerId="LiveId" clId="{0F071940-DD68-4CEA-9DDC-F961E0B3FF69}" dt="2025-05-24T17:42:39.553" v="880" actId="1036"/>
           <ac:cxnSpMkLst>
             <pc:docMk/>
             <pc:sldMk cId="2001934226" sldId="256"/>
@@ -3771,8 +3819,8 @@
         </p:blipFill>
         <p:spPr>
           <a:xfrm>
-            <a:off x="13930" y="565769"/>
-            <a:ext cx="2160000" cy="1868906"/>
+            <a:off x="129262" y="755243"/>
+            <a:ext cx="1980000" cy="1713164"/>
           </a:xfrm>
           <a:prstGeom prst="rect">
             <a:avLst/>
@@ -3806,8 +3854,8 @@
         </p:blipFill>
         <p:spPr>
           <a:xfrm>
-            <a:off x="2213102" y="565769"/>
-            <a:ext cx="1911977" cy="1868400"/>
+            <a:off x="2262530" y="755243"/>
+            <a:ext cx="1753200" cy="1713242"/>
           </a:xfrm>
           <a:prstGeom prst="rect">
             <a:avLst/>
@@ -3841,8 +3889,8 @@
         </p:blipFill>
         <p:spPr>
           <a:xfrm>
-            <a:off x="13930" y="2483476"/>
-            <a:ext cx="2160000" cy="1868906"/>
+            <a:off x="129262" y="2664712"/>
+            <a:ext cx="1980000" cy="1713164"/>
           </a:xfrm>
           <a:prstGeom prst="rect">
             <a:avLst/>
@@ -3876,8 +3924,8 @@
         </p:blipFill>
         <p:spPr>
           <a:xfrm>
-            <a:off x="2213102" y="2483476"/>
-            <a:ext cx="1911977" cy="1868400"/>
+            <a:off x="2262530" y="2664712"/>
+            <a:ext cx="1753200" cy="1713242"/>
           </a:xfrm>
           <a:prstGeom prst="rect">
             <a:avLst/>
@@ -3911,8 +3959,8 @@
         </p:blipFill>
         <p:spPr>
           <a:xfrm>
-            <a:off x="13930" y="4401182"/>
-            <a:ext cx="2160000" cy="2046078"/>
+            <a:off x="137500" y="4582418"/>
+            <a:ext cx="1980000" cy="1875572"/>
           </a:xfrm>
           <a:prstGeom prst="rect">
             <a:avLst/>
@@ -3946,8 +3994,8 @@
         </p:blipFill>
         <p:spPr>
           <a:xfrm>
-            <a:off x="2213101" y="4401182"/>
-            <a:ext cx="1911300" cy="2044800"/>
+            <a:off x="2270768" y="4582418"/>
+            <a:ext cx="1753147" cy="1875600"/>
           </a:xfrm>
           <a:prstGeom prst="rect">
             <a:avLst/>
@@ -4026,390 +4074,6 @@
       </p:sp>
       <p:sp>
         <p:nvSpPr>
-          <p:cNvPr id="18" name="TextBox 17">
-            <a:extLst>
-              <a:ext uri="{FF2B5EF4-FFF2-40B4-BE49-F238E27FC236}">
-                <a16:creationId xmlns:a16="http://schemas.microsoft.com/office/drawing/2014/main" id="{18F79773-A305-6943-D6AB-6A9BB374B2B4}"/>
-              </a:ext>
-            </a:extLst>
-          </p:cNvPr>
-          <p:cNvSpPr txBox="1"/>
-          <p:nvPr/>
-        </p:nvSpPr>
-        <p:spPr>
-          <a:xfrm>
-            <a:off x="376106" y="1465054"/>
-            <a:ext cx="842873" cy="461665"/>
-          </a:xfrm>
-          <a:prstGeom prst="rect">
-            <a:avLst/>
-          </a:prstGeom>
-          <a:solidFill>
-            <a:schemeClr val="bg1"/>
-          </a:solidFill>
-          <a:ln>
-            <a:solidFill>
-              <a:schemeClr val="bg1">
-                <a:lumMod val="50000"/>
-              </a:schemeClr>
-            </a:solidFill>
-          </a:ln>
-        </p:spPr>
-        <p:txBody>
-          <a:bodyPr wrap="square" rtlCol="0">
-            <a:spAutoFit/>
-          </a:bodyPr>
-          <a:lstStyle/>
-          <a:p>
-            <a:pPr algn="ctr"/>
-            <a:r>
-              <a:rPr lang="en-US" sz="800" dirty="0">
-                <a:solidFill>
-                  <a:schemeClr val="tx1">
-                    <a:lumMod val="95000"/>
-                    <a:lumOff val="5000"/>
-                  </a:schemeClr>
-                </a:solidFill>
-                <a:latin typeface="Calibri Light" panose="020F0302020204030204" pitchFamily="34" charset="0"/>
-                <a:cs typeface="Calibri Light" panose="020F0302020204030204" pitchFamily="34" charset="0"/>
-              </a:rPr>
-              <a:t>a) short-range forecast (reanalysis)</a:t>
-            </a:r>
-            <a:endParaRPr lang="en-GB" sz="800" dirty="0">
-              <a:solidFill>
-                <a:schemeClr val="tx1">
-                  <a:lumMod val="95000"/>
-                  <a:lumOff val="5000"/>
-                </a:schemeClr>
-              </a:solidFill>
-              <a:latin typeface="Calibri Light" panose="020F0302020204030204" pitchFamily="34" charset="0"/>
-              <a:cs typeface="Calibri Light" panose="020F0302020204030204" pitchFamily="34" charset="0"/>
-            </a:endParaRPr>
-          </a:p>
-        </p:txBody>
-      </p:sp>
-      <p:sp>
-        <p:nvSpPr>
-          <p:cNvPr id="21" name="TextBox 20">
-            <a:extLst>
-              <a:ext uri="{FF2B5EF4-FFF2-40B4-BE49-F238E27FC236}">
-                <a16:creationId xmlns:a16="http://schemas.microsoft.com/office/drawing/2014/main" id="{0284A2DC-04F5-0D2C-8A57-01740B49A0AD}"/>
-              </a:ext>
-            </a:extLst>
-          </p:cNvPr>
-          <p:cNvSpPr txBox="1"/>
-          <p:nvPr/>
-        </p:nvSpPr>
-        <p:spPr>
-          <a:xfrm>
-            <a:off x="2325878" y="1465053"/>
-            <a:ext cx="842873" cy="461665"/>
-          </a:xfrm>
-          <a:prstGeom prst="rect">
-            <a:avLst/>
-          </a:prstGeom>
-          <a:solidFill>
-            <a:schemeClr val="bg1"/>
-          </a:solidFill>
-          <a:ln>
-            <a:solidFill>
-              <a:schemeClr val="bg1">
-                <a:lumMod val="50000"/>
-              </a:schemeClr>
-            </a:solidFill>
-          </a:ln>
-        </p:spPr>
-        <p:txBody>
-          <a:bodyPr wrap="square" rtlCol="0">
-            <a:spAutoFit/>
-          </a:bodyPr>
-          <a:lstStyle/>
-          <a:p>
-            <a:pPr algn="ctr"/>
-            <a:r>
-              <a:rPr lang="en-US" sz="800" dirty="0">
-                <a:solidFill>
-                  <a:schemeClr val="tx1">
-                    <a:lumMod val="95000"/>
-                    <a:lumOff val="5000"/>
-                  </a:schemeClr>
-                </a:solidFill>
-                <a:latin typeface="Calibri Light" panose="020F0302020204030204" pitchFamily="34" charset="0"/>
-                <a:cs typeface="Calibri Light" panose="020F0302020204030204" pitchFamily="34" charset="0"/>
-              </a:rPr>
-              <a:t>b) long-range forecast (t+0,t+24)</a:t>
-            </a:r>
-            <a:endParaRPr lang="en-GB" sz="800" dirty="0">
-              <a:solidFill>
-                <a:schemeClr val="tx1">
-                  <a:lumMod val="95000"/>
-                  <a:lumOff val="5000"/>
-                </a:schemeClr>
-              </a:solidFill>
-              <a:latin typeface="Calibri Light" panose="020F0302020204030204" pitchFamily="34" charset="0"/>
-              <a:cs typeface="Calibri Light" panose="020F0302020204030204" pitchFamily="34" charset="0"/>
-            </a:endParaRPr>
-          </a:p>
-        </p:txBody>
-      </p:sp>
-      <p:sp>
-        <p:nvSpPr>
-          <p:cNvPr id="22" name="TextBox 21">
-            <a:extLst>
-              <a:ext uri="{FF2B5EF4-FFF2-40B4-BE49-F238E27FC236}">
-                <a16:creationId xmlns:a16="http://schemas.microsoft.com/office/drawing/2014/main" id="{7792FD3C-224E-D659-A131-B255E8E96E52}"/>
-              </a:ext>
-            </a:extLst>
-          </p:cNvPr>
-          <p:cNvSpPr txBox="1"/>
-          <p:nvPr/>
-        </p:nvSpPr>
-        <p:spPr>
-          <a:xfrm>
-            <a:off x="376106" y="3389613"/>
-            <a:ext cx="842873" cy="461665"/>
-          </a:xfrm>
-          <a:prstGeom prst="rect">
-            <a:avLst/>
-          </a:prstGeom>
-          <a:solidFill>
-            <a:schemeClr val="bg1"/>
-          </a:solidFill>
-          <a:ln>
-            <a:solidFill>
-              <a:schemeClr val="bg1">
-                <a:lumMod val="50000"/>
-              </a:schemeClr>
-            </a:solidFill>
-          </a:ln>
-        </p:spPr>
-        <p:txBody>
-          <a:bodyPr wrap="square" rtlCol="0">
-            <a:spAutoFit/>
-          </a:bodyPr>
-          <a:lstStyle/>
-          <a:p>
-            <a:pPr algn="ctr"/>
-            <a:r>
-              <a:rPr lang="en-US" sz="800" dirty="0">
-                <a:solidFill>
-                  <a:schemeClr val="tx1">
-                    <a:lumMod val="95000"/>
-                    <a:lumOff val="5000"/>
-                  </a:schemeClr>
-                </a:solidFill>
-                <a:latin typeface="Calibri Light" panose="020F0302020204030204" pitchFamily="34" charset="0"/>
-                <a:cs typeface="Calibri Light" panose="020F0302020204030204" pitchFamily="34" charset="0"/>
-              </a:rPr>
-              <a:t>c) long-range forecast (t+24,t+48)</a:t>
-            </a:r>
-            <a:endParaRPr lang="en-GB" sz="800" dirty="0">
-              <a:solidFill>
-                <a:schemeClr val="tx1">
-                  <a:lumMod val="95000"/>
-                  <a:lumOff val="5000"/>
-                </a:schemeClr>
-              </a:solidFill>
-              <a:latin typeface="Calibri Light" panose="020F0302020204030204" pitchFamily="34" charset="0"/>
-              <a:cs typeface="Calibri Light" panose="020F0302020204030204" pitchFamily="34" charset="0"/>
-            </a:endParaRPr>
-          </a:p>
-        </p:txBody>
-      </p:sp>
-      <p:sp>
-        <p:nvSpPr>
-          <p:cNvPr id="23" name="TextBox 22">
-            <a:extLst>
-              <a:ext uri="{FF2B5EF4-FFF2-40B4-BE49-F238E27FC236}">
-                <a16:creationId xmlns:a16="http://schemas.microsoft.com/office/drawing/2014/main" id="{F19462D0-2710-AA91-1CCF-483BA08755F9}"/>
-              </a:ext>
-            </a:extLst>
-          </p:cNvPr>
-          <p:cNvSpPr txBox="1"/>
-          <p:nvPr/>
-        </p:nvSpPr>
-        <p:spPr>
-          <a:xfrm>
-            <a:off x="2325878" y="3389613"/>
-            <a:ext cx="842873" cy="461665"/>
-          </a:xfrm>
-          <a:prstGeom prst="rect">
-            <a:avLst/>
-          </a:prstGeom>
-          <a:solidFill>
-            <a:schemeClr val="bg1"/>
-          </a:solidFill>
-          <a:ln>
-            <a:solidFill>
-              <a:schemeClr val="bg1">
-                <a:lumMod val="50000"/>
-              </a:schemeClr>
-            </a:solidFill>
-          </a:ln>
-        </p:spPr>
-        <p:txBody>
-          <a:bodyPr wrap="square" rtlCol="0">
-            <a:spAutoFit/>
-          </a:bodyPr>
-          <a:lstStyle/>
-          <a:p>
-            <a:pPr algn="ctr"/>
-            <a:r>
-              <a:rPr lang="en-US" sz="800" dirty="0">
-                <a:solidFill>
-                  <a:schemeClr val="tx1">
-                    <a:lumMod val="95000"/>
-                    <a:lumOff val="5000"/>
-                  </a:schemeClr>
-                </a:solidFill>
-                <a:latin typeface="Calibri Light" panose="020F0302020204030204" pitchFamily="34" charset="0"/>
-                <a:cs typeface="Calibri Light" panose="020F0302020204030204" pitchFamily="34" charset="0"/>
-              </a:rPr>
-              <a:t>d) long-range forecast (t+48,t+72)</a:t>
-            </a:r>
-            <a:endParaRPr lang="en-GB" sz="800" dirty="0">
-              <a:solidFill>
-                <a:schemeClr val="tx1">
-                  <a:lumMod val="95000"/>
-                  <a:lumOff val="5000"/>
-                </a:schemeClr>
-              </a:solidFill>
-              <a:latin typeface="Calibri Light" panose="020F0302020204030204" pitchFamily="34" charset="0"/>
-              <a:cs typeface="Calibri Light" panose="020F0302020204030204" pitchFamily="34" charset="0"/>
-            </a:endParaRPr>
-          </a:p>
-        </p:txBody>
-      </p:sp>
-      <p:sp>
-        <p:nvSpPr>
-          <p:cNvPr id="24" name="TextBox 23">
-            <a:extLst>
-              <a:ext uri="{FF2B5EF4-FFF2-40B4-BE49-F238E27FC236}">
-                <a16:creationId xmlns:a16="http://schemas.microsoft.com/office/drawing/2014/main" id="{728394F9-CAEC-DD34-1C7D-BCD4BEC3F436}"/>
-              </a:ext>
-            </a:extLst>
-          </p:cNvPr>
-          <p:cNvSpPr txBox="1"/>
-          <p:nvPr/>
-        </p:nvSpPr>
-        <p:spPr>
-          <a:xfrm>
-            <a:off x="376105" y="5317114"/>
-            <a:ext cx="842873" cy="461665"/>
-          </a:xfrm>
-          <a:prstGeom prst="rect">
-            <a:avLst/>
-          </a:prstGeom>
-          <a:solidFill>
-            <a:schemeClr val="bg1"/>
-          </a:solidFill>
-          <a:ln>
-            <a:solidFill>
-              <a:schemeClr val="bg1">
-                <a:lumMod val="50000"/>
-              </a:schemeClr>
-            </a:solidFill>
-          </a:ln>
-        </p:spPr>
-        <p:txBody>
-          <a:bodyPr wrap="square" rtlCol="0">
-            <a:spAutoFit/>
-          </a:bodyPr>
-          <a:lstStyle/>
-          <a:p>
-            <a:pPr algn="ctr"/>
-            <a:r>
-              <a:rPr lang="en-US" sz="800" dirty="0">
-                <a:solidFill>
-                  <a:schemeClr val="tx1">
-                    <a:lumMod val="95000"/>
-                    <a:lumOff val="5000"/>
-                  </a:schemeClr>
-                </a:solidFill>
-                <a:latin typeface="Calibri Light" panose="020F0302020204030204" pitchFamily="34" charset="0"/>
-                <a:cs typeface="Calibri Light" panose="020F0302020204030204" pitchFamily="34" charset="0"/>
-              </a:rPr>
-              <a:t>e) long-range forecast (t+72,t+96)</a:t>
-            </a:r>
-            <a:endParaRPr lang="en-GB" sz="800" dirty="0">
-              <a:solidFill>
-                <a:schemeClr val="tx1">
-                  <a:lumMod val="95000"/>
-                  <a:lumOff val="5000"/>
-                </a:schemeClr>
-              </a:solidFill>
-              <a:latin typeface="Calibri Light" panose="020F0302020204030204" pitchFamily="34" charset="0"/>
-              <a:cs typeface="Calibri Light" panose="020F0302020204030204" pitchFamily="34" charset="0"/>
-            </a:endParaRPr>
-          </a:p>
-        </p:txBody>
-      </p:sp>
-      <p:sp>
-        <p:nvSpPr>
-          <p:cNvPr id="25" name="TextBox 24">
-            <a:extLst>
-              <a:ext uri="{FF2B5EF4-FFF2-40B4-BE49-F238E27FC236}">
-                <a16:creationId xmlns:a16="http://schemas.microsoft.com/office/drawing/2014/main" id="{FC832C13-787F-2152-898E-AA680DE9C99E}"/>
-              </a:ext>
-            </a:extLst>
-          </p:cNvPr>
-          <p:cNvSpPr txBox="1"/>
-          <p:nvPr/>
-        </p:nvSpPr>
-        <p:spPr>
-          <a:xfrm>
-            <a:off x="2325878" y="5317113"/>
-            <a:ext cx="842873" cy="461665"/>
-          </a:xfrm>
-          <a:prstGeom prst="rect">
-            <a:avLst/>
-          </a:prstGeom>
-          <a:solidFill>
-            <a:schemeClr val="bg1"/>
-          </a:solidFill>
-          <a:ln>
-            <a:solidFill>
-              <a:schemeClr val="bg1">
-                <a:lumMod val="50000"/>
-              </a:schemeClr>
-            </a:solidFill>
-          </a:ln>
-        </p:spPr>
-        <p:txBody>
-          <a:bodyPr wrap="square" rtlCol="0">
-            <a:spAutoFit/>
-          </a:bodyPr>
-          <a:lstStyle/>
-          <a:p>
-            <a:pPr algn="ctr"/>
-            <a:r>
-              <a:rPr lang="en-US" sz="800" dirty="0">
-                <a:solidFill>
-                  <a:schemeClr val="tx1">
-                    <a:lumMod val="95000"/>
-                    <a:lumOff val="5000"/>
-                  </a:schemeClr>
-                </a:solidFill>
-                <a:latin typeface="Calibri Light" panose="020F0302020204030204" pitchFamily="34" charset="0"/>
-                <a:cs typeface="Calibri Light" panose="020F0302020204030204" pitchFamily="34" charset="0"/>
-              </a:rPr>
-              <a:t>f) long-range forecast (t+96,t+120)</a:t>
-            </a:r>
-            <a:endParaRPr lang="en-GB" sz="800" dirty="0">
-              <a:solidFill>
-                <a:schemeClr val="tx1">
-                  <a:lumMod val="95000"/>
-                  <a:lumOff val="5000"/>
-                </a:schemeClr>
-              </a:solidFill>
-              <a:latin typeface="Calibri Light" panose="020F0302020204030204" pitchFamily="34" charset="0"/>
-              <a:cs typeface="Calibri Light" panose="020F0302020204030204" pitchFamily="34" charset="0"/>
-            </a:endParaRPr>
-          </a:p>
-        </p:txBody>
-      </p:sp>
-      <p:sp>
-        <p:nvSpPr>
           <p:cNvPr id="3" name="TextBox 2">
             <a:extLst>
               <a:ext uri="{FF2B5EF4-FFF2-40B4-BE49-F238E27FC236}">
@@ -4422,7 +4086,7 @@
         </p:nvSpPr>
         <p:spPr>
           <a:xfrm>
-            <a:off x="1079243" y="354873"/>
+            <a:off x="1062767" y="387825"/>
             <a:ext cx="1196419" cy="215444"/>
           </a:xfrm>
           <a:prstGeom prst="rect">
@@ -4479,7 +4143,7 @@
         </p:nvSpPr>
         <p:spPr>
           <a:xfrm>
-            <a:off x="2090746" y="417595"/>
+            <a:off x="2090746" y="450547"/>
             <a:ext cx="360000" cy="90000"/>
           </a:xfrm>
           <a:prstGeom prst="rect">
@@ -4539,7 +4203,7 @@
         </p:nvCxnSpPr>
         <p:spPr>
           <a:xfrm>
-            <a:off x="783439" y="462595"/>
+            <a:off x="766963" y="495547"/>
             <a:ext cx="360000" cy="0"/>
           </a:xfrm>
           <a:prstGeom prst="line">
@@ -4580,7 +4244,7 @@
         </p:nvSpPr>
         <p:spPr>
           <a:xfrm>
-            <a:off x="2389418" y="354873"/>
+            <a:off x="2389418" y="387825"/>
             <a:ext cx="1196419" cy="215444"/>
           </a:xfrm>
           <a:prstGeom prst="rect">
@@ -4609,6 +4273,348 @@
                 <a:cs typeface="Calibri Light" panose="020F0302020204030204" pitchFamily="34" charset="0"/>
               </a:rPr>
               <a:t>99% confidence interval</a:t>
+            </a:r>
+            <a:endParaRPr lang="en-GB" sz="800" dirty="0">
+              <a:solidFill>
+                <a:schemeClr val="tx1">
+                  <a:lumMod val="95000"/>
+                  <a:lumOff val="5000"/>
+                </a:schemeClr>
+              </a:solidFill>
+              <a:latin typeface="Calibri Light" panose="020F0302020204030204" pitchFamily="34" charset="0"/>
+              <a:cs typeface="Calibri Light" panose="020F0302020204030204" pitchFamily="34" charset="0"/>
+            </a:endParaRPr>
+          </a:p>
+        </p:txBody>
+      </p:sp>
+      <p:sp>
+        <p:nvSpPr>
+          <p:cNvPr id="2" name="TextBox 1">
+            <a:extLst>
+              <a:ext uri="{FF2B5EF4-FFF2-40B4-BE49-F238E27FC236}">
+                <a16:creationId xmlns:a16="http://schemas.microsoft.com/office/drawing/2014/main" id="{A4DB30E2-0C13-6AEB-59CD-284D83DB8123}"/>
+              </a:ext>
+            </a:extLst>
+          </p:cNvPr>
+          <p:cNvSpPr txBox="1"/>
+          <p:nvPr/>
+        </p:nvSpPr>
+        <p:spPr>
+          <a:xfrm>
+            <a:off x="2135147" y="559809"/>
+            <a:ext cx="1908000" cy="216000"/>
+          </a:xfrm>
+          <a:prstGeom prst="rect">
+            <a:avLst/>
+          </a:prstGeom>
+          <a:noFill/>
+          <a:ln>
+            <a:noFill/>
+          </a:ln>
+        </p:spPr>
+        <p:txBody>
+          <a:bodyPr wrap="square" rtlCol="0">
+            <a:spAutoFit/>
+          </a:bodyPr>
+          <a:lstStyle/>
+          <a:p>
+            <a:r>
+              <a:rPr lang="en-US" sz="800" dirty="0">
+                <a:solidFill>
+                  <a:schemeClr val="tx1">
+                    <a:lumMod val="95000"/>
+                    <a:lumOff val="5000"/>
+                  </a:schemeClr>
+                </a:solidFill>
+                <a:latin typeface="Calibri Light" panose="020F0302020204030204" pitchFamily="34" charset="0"/>
+                <a:cs typeface="Calibri Light" panose="020F0302020204030204" pitchFamily="34" charset="0"/>
+              </a:rPr>
+              <a:t>b) long-range forecast (t+0,t+24)</a:t>
+            </a:r>
+            <a:endParaRPr lang="en-GB" sz="800" dirty="0">
+              <a:solidFill>
+                <a:schemeClr val="tx1">
+                  <a:lumMod val="95000"/>
+                  <a:lumOff val="5000"/>
+                </a:schemeClr>
+              </a:solidFill>
+              <a:latin typeface="Calibri Light" panose="020F0302020204030204" pitchFamily="34" charset="0"/>
+              <a:cs typeface="Calibri Light" panose="020F0302020204030204" pitchFamily="34" charset="0"/>
+            </a:endParaRPr>
+          </a:p>
+        </p:txBody>
+      </p:sp>
+      <p:sp>
+        <p:nvSpPr>
+          <p:cNvPr id="7" name="TextBox 6">
+            <a:extLst>
+              <a:ext uri="{FF2B5EF4-FFF2-40B4-BE49-F238E27FC236}">
+                <a16:creationId xmlns:a16="http://schemas.microsoft.com/office/drawing/2014/main" id="{42DFAD48-F16E-0B7B-1B2C-4961BF796F2E}"/>
+              </a:ext>
+            </a:extLst>
+          </p:cNvPr>
+          <p:cNvSpPr txBox="1"/>
+          <p:nvPr/>
+        </p:nvSpPr>
+        <p:spPr>
+          <a:xfrm>
+            <a:off x="22923" y="559809"/>
+            <a:ext cx="1908000" cy="215444"/>
+          </a:xfrm>
+          <a:prstGeom prst="rect">
+            <a:avLst/>
+          </a:prstGeom>
+          <a:noFill/>
+          <a:ln>
+            <a:noFill/>
+          </a:ln>
+        </p:spPr>
+        <p:txBody>
+          <a:bodyPr wrap="square" rtlCol="0">
+            <a:spAutoFit/>
+          </a:bodyPr>
+          <a:lstStyle/>
+          <a:p>
+            <a:r>
+              <a:rPr lang="en-US" sz="800" dirty="0">
+                <a:solidFill>
+                  <a:schemeClr val="tx1">
+                    <a:lumMod val="95000"/>
+                    <a:lumOff val="5000"/>
+                  </a:schemeClr>
+                </a:solidFill>
+                <a:latin typeface="Calibri Light" panose="020F0302020204030204" pitchFamily="34" charset="0"/>
+                <a:cs typeface="Calibri Light" panose="020F0302020204030204" pitchFamily="34" charset="0"/>
+              </a:rPr>
+              <a:t>a) short-range forecast (reanalysis)</a:t>
+            </a:r>
+            <a:endParaRPr lang="en-GB" sz="800" dirty="0">
+              <a:solidFill>
+                <a:schemeClr val="tx1">
+                  <a:lumMod val="95000"/>
+                  <a:lumOff val="5000"/>
+                </a:schemeClr>
+              </a:solidFill>
+              <a:latin typeface="Calibri Light" panose="020F0302020204030204" pitchFamily="34" charset="0"/>
+              <a:cs typeface="Calibri Light" panose="020F0302020204030204" pitchFamily="34" charset="0"/>
+            </a:endParaRPr>
+          </a:p>
+        </p:txBody>
+      </p:sp>
+      <p:sp>
+        <p:nvSpPr>
+          <p:cNvPr id="8" name="TextBox 7">
+            <a:extLst>
+              <a:ext uri="{FF2B5EF4-FFF2-40B4-BE49-F238E27FC236}">
+                <a16:creationId xmlns:a16="http://schemas.microsoft.com/office/drawing/2014/main" id="{1CB5778A-BC41-27A9-C316-14307500D4A0}"/>
+              </a:ext>
+            </a:extLst>
+          </p:cNvPr>
+          <p:cNvSpPr txBox="1"/>
+          <p:nvPr/>
+        </p:nvSpPr>
+        <p:spPr>
+          <a:xfrm>
+            <a:off x="97065" y="2457641"/>
+            <a:ext cx="1908000" cy="215444"/>
+          </a:xfrm>
+          <a:prstGeom prst="rect">
+            <a:avLst/>
+          </a:prstGeom>
+          <a:noFill/>
+          <a:ln>
+            <a:noFill/>
+          </a:ln>
+        </p:spPr>
+        <p:txBody>
+          <a:bodyPr wrap="square" rtlCol="0">
+            <a:spAutoFit/>
+          </a:bodyPr>
+          <a:lstStyle/>
+          <a:p>
+            <a:r>
+              <a:rPr lang="en-US" sz="800" dirty="0">
+                <a:solidFill>
+                  <a:schemeClr val="tx1">
+                    <a:lumMod val="95000"/>
+                    <a:lumOff val="5000"/>
+                  </a:schemeClr>
+                </a:solidFill>
+                <a:latin typeface="Calibri Light" panose="020F0302020204030204" pitchFamily="34" charset="0"/>
+                <a:cs typeface="Calibri Light" panose="020F0302020204030204" pitchFamily="34" charset="0"/>
+              </a:rPr>
+              <a:t>c) long-range forecast (t+24,t+48)</a:t>
+            </a:r>
+            <a:endParaRPr lang="en-GB" sz="800" dirty="0">
+              <a:solidFill>
+                <a:schemeClr val="tx1">
+                  <a:lumMod val="95000"/>
+                  <a:lumOff val="5000"/>
+                </a:schemeClr>
+              </a:solidFill>
+              <a:latin typeface="Calibri Light" panose="020F0302020204030204" pitchFamily="34" charset="0"/>
+              <a:cs typeface="Calibri Light" panose="020F0302020204030204" pitchFamily="34" charset="0"/>
+            </a:endParaRPr>
+          </a:p>
+        </p:txBody>
+      </p:sp>
+      <p:sp>
+        <p:nvSpPr>
+          <p:cNvPr id="9" name="TextBox 8">
+            <a:extLst>
+              <a:ext uri="{FF2B5EF4-FFF2-40B4-BE49-F238E27FC236}">
+                <a16:creationId xmlns:a16="http://schemas.microsoft.com/office/drawing/2014/main" id="{AD646CE8-3370-880E-200D-80617E77A9BE}"/>
+              </a:ext>
+            </a:extLst>
+          </p:cNvPr>
+          <p:cNvSpPr txBox="1"/>
+          <p:nvPr/>
+        </p:nvSpPr>
+        <p:spPr>
+          <a:xfrm>
+            <a:off x="97065" y="4381575"/>
+            <a:ext cx="1908000" cy="215444"/>
+          </a:xfrm>
+          <a:prstGeom prst="rect">
+            <a:avLst/>
+          </a:prstGeom>
+          <a:noFill/>
+          <a:ln>
+            <a:noFill/>
+          </a:ln>
+        </p:spPr>
+        <p:txBody>
+          <a:bodyPr wrap="square" rtlCol="0">
+            <a:spAutoFit/>
+          </a:bodyPr>
+          <a:lstStyle/>
+          <a:p>
+            <a:r>
+              <a:rPr lang="en-US" sz="800" dirty="0">
+                <a:solidFill>
+                  <a:schemeClr val="tx1">
+                    <a:lumMod val="95000"/>
+                    <a:lumOff val="5000"/>
+                  </a:schemeClr>
+                </a:solidFill>
+                <a:latin typeface="Calibri Light" panose="020F0302020204030204" pitchFamily="34" charset="0"/>
+                <a:cs typeface="Calibri Light" panose="020F0302020204030204" pitchFamily="34" charset="0"/>
+              </a:rPr>
+              <a:t>e) long-range forecast (t+72,t+96)</a:t>
+            </a:r>
+            <a:endParaRPr lang="en-GB" sz="800" dirty="0">
+              <a:solidFill>
+                <a:schemeClr val="tx1">
+                  <a:lumMod val="95000"/>
+                  <a:lumOff val="5000"/>
+                </a:schemeClr>
+              </a:solidFill>
+              <a:latin typeface="Calibri Light" panose="020F0302020204030204" pitchFamily="34" charset="0"/>
+              <a:cs typeface="Calibri Light" panose="020F0302020204030204" pitchFamily="34" charset="0"/>
+            </a:endParaRPr>
+          </a:p>
+        </p:txBody>
+      </p:sp>
+      <p:sp>
+        <p:nvSpPr>
+          <p:cNvPr id="10" name="TextBox 9">
+            <a:extLst>
+              <a:ext uri="{FF2B5EF4-FFF2-40B4-BE49-F238E27FC236}">
+                <a16:creationId xmlns:a16="http://schemas.microsoft.com/office/drawing/2014/main" id="{8DB64281-D2AB-318B-65A1-5D1D385CB8D7}"/>
+              </a:ext>
+            </a:extLst>
+          </p:cNvPr>
+          <p:cNvSpPr txBox="1"/>
+          <p:nvPr/>
+        </p:nvSpPr>
+        <p:spPr>
+          <a:xfrm>
+            <a:off x="2135147" y="2457085"/>
+            <a:ext cx="1908000" cy="216000"/>
+          </a:xfrm>
+          <a:prstGeom prst="rect">
+            <a:avLst/>
+          </a:prstGeom>
+          <a:noFill/>
+          <a:ln>
+            <a:noFill/>
+          </a:ln>
+        </p:spPr>
+        <p:txBody>
+          <a:bodyPr wrap="square" rtlCol="0">
+            <a:spAutoFit/>
+          </a:bodyPr>
+          <a:lstStyle/>
+          <a:p>
+            <a:r>
+              <a:rPr lang="en-US" sz="800" dirty="0">
+                <a:solidFill>
+                  <a:schemeClr val="tx1">
+                    <a:lumMod val="95000"/>
+                    <a:lumOff val="5000"/>
+                  </a:schemeClr>
+                </a:solidFill>
+                <a:latin typeface="Calibri Light" panose="020F0302020204030204" pitchFamily="34" charset="0"/>
+                <a:cs typeface="Calibri Light" panose="020F0302020204030204" pitchFamily="34" charset="0"/>
+              </a:rPr>
+              <a:t>d) long-range forecast (t+48,t+72)</a:t>
+            </a:r>
+            <a:endParaRPr lang="en-GB" sz="800" dirty="0">
+              <a:solidFill>
+                <a:schemeClr val="tx1">
+                  <a:lumMod val="95000"/>
+                  <a:lumOff val="5000"/>
+                </a:schemeClr>
+              </a:solidFill>
+              <a:latin typeface="Calibri Light" panose="020F0302020204030204" pitchFamily="34" charset="0"/>
+              <a:cs typeface="Calibri Light" panose="020F0302020204030204" pitchFamily="34" charset="0"/>
+            </a:endParaRPr>
+          </a:p>
+        </p:txBody>
+      </p:sp>
+      <p:sp>
+        <p:nvSpPr>
+          <p:cNvPr id="11" name="TextBox 10">
+            <a:extLst>
+              <a:ext uri="{FF2B5EF4-FFF2-40B4-BE49-F238E27FC236}">
+                <a16:creationId xmlns:a16="http://schemas.microsoft.com/office/drawing/2014/main" id="{E8F936EE-D86D-608C-06B5-BAF9C398C95A}"/>
+              </a:ext>
+            </a:extLst>
+          </p:cNvPr>
+          <p:cNvSpPr txBox="1"/>
+          <p:nvPr/>
+        </p:nvSpPr>
+        <p:spPr>
+          <a:xfrm>
+            <a:off x="2135147" y="4376653"/>
+            <a:ext cx="1908000" cy="216000"/>
+          </a:xfrm>
+          <a:prstGeom prst="rect">
+            <a:avLst/>
+          </a:prstGeom>
+          <a:noFill/>
+          <a:ln>
+            <a:noFill/>
+          </a:ln>
+        </p:spPr>
+        <p:txBody>
+          <a:bodyPr wrap="square" rtlCol="0">
+            <a:spAutoFit/>
+          </a:bodyPr>
+          <a:lstStyle/>
+          <a:p>
+            <a:r>
+              <a:rPr lang="en-US" sz="800" dirty="0">
+                <a:solidFill>
+                  <a:schemeClr val="tx1">
+                    <a:lumMod val="95000"/>
+                    <a:lumOff val="5000"/>
+                  </a:schemeClr>
+                </a:solidFill>
+                <a:latin typeface="Calibri Light" panose="020F0302020204030204" pitchFamily="34" charset="0"/>
+                <a:cs typeface="Calibri Light" panose="020F0302020204030204" pitchFamily="34" charset="0"/>
+              </a:rPr>
+              <a:t>f) long-range forecast (t+96,t+120)</a:t>
             </a:r>
             <a:endParaRPr lang="en-GB" sz="800" dirty="0">
               <a:solidFill>

</xml_diff>